<commit_message>
Update .gitignore and plot_likelihood.py
- Add /Publication to .gitignore
- Update x-axis label in plot_likelihood.py
</commit_message>
<xml_diff>
--- a/results/plots/Collation.pptx
+++ b/results/plots/Collation.pptx
@@ -246,7 +246,7 @@
           <a:p>
             <a:fld id="{5CF04FA6-8A04-5741-B772-B0883F541F5F}" type="datetimeFigureOut">
               <a:rPr lang="en-US" smtClean="0"/>
-              <a:t>5/5/24</a:t>
+              <a:t>10/24/24</a:t>
             </a:fld>
             <a:endParaRPr lang="en-US"/>
           </a:p>
@@ -416,7 +416,7 @@
           <a:p>
             <a:fld id="{5CF04FA6-8A04-5741-B772-B0883F541F5F}" type="datetimeFigureOut">
               <a:rPr lang="en-US" smtClean="0"/>
-              <a:t>5/5/24</a:t>
+              <a:t>10/24/24</a:t>
             </a:fld>
             <a:endParaRPr lang="en-US"/>
           </a:p>
@@ -596,7 +596,7 @@
           <a:p>
             <a:fld id="{5CF04FA6-8A04-5741-B772-B0883F541F5F}" type="datetimeFigureOut">
               <a:rPr lang="en-US" smtClean="0"/>
-              <a:t>5/5/24</a:t>
+              <a:t>10/24/24</a:t>
             </a:fld>
             <a:endParaRPr lang="en-US"/>
           </a:p>
@@ -766,7 +766,7 @@
           <a:p>
             <a:fld id="{5CF04FA6-8A04-5741-B772-B0883F541F5F}" type="datetimeFigureOut">
               <a:rPr lang="en-US" smtClean="0"/>
-              <a:t>5/5/24</a:t>
+              <a:t>10/24/24</a:t>
             </a:fld>
             <a:endParaRPr lang="en-US"/>
           </a:p>
@@ -1012,7 +1012,7 @@
           <a:p>
             <a:fld id="{5CF04FA6-8A04-5741-B772-B0883F541F5F}" type="datetimeFigureOut">
               <a:rPr lang="en-US" smtClean="0"/>
-              <a:t>5/5/24</a:t>
+              <a:t>10/24/24</a:t>
             </a:fld>
             <a:endParaRPr lang="en-US"/>
           </a:p>
@@ -1244,7 +1244,7 @@
           <a:p>
             <a:fld id="{5CF04FA6-8A04-5741-B772-B0883F541F5F}" type="datetimeFigureOut">
               <a:rPr lang="en-US" smtClean="0"/>
-              <a:t>5/5/24</a:t>
+              <a:t>10/24/24</a:t>
             </a:fld>
             <a:endParaRPr lang="en-US"/>
           </a:p>
@@ -1611,7 +1611,7 @@
           <a:p>
             <a:fld id="{5CF04FA6-8A04-5741-B772-B0883F541F5F}" type="datetimeFigureOut">
               <a:rPr lang="en-US" smtClean="0"/>
-              <a:t>5/5/24</a:t>
+              <a:t>10/24/24</a:t>
             </a:fld>
             <a:endParaRPr lang="en-US"/>
           </a:p>
@@ -1729,7 +1729,7 @@
           <a:p>
             <a:fld id="{5CF04FA6-8A04-5741-B772-B0883F541F5F}" type="datetimeFigureOut">
               <a:rPr lang="en-US" smtClean="0"/>
-              <a:t>5/5/24</a:t>
+              <a:t>10/24/24</a:t>
             </a:fld>
             <a:endParaRPr lang="en-US"/>
           </a:p>
@@ -1824,7 +1824,7 @@
           <a:p>
             <a:fld id="{5CF04FA6-8A04-5741-B772-B0883F541F5F}" type="datetimeFigureOut">
               <a:rPr lang="en-US" smtClean="0"/>
-              <a:t>5/5/24</a:t>
+              <a:t>10/24/24</a:t>
             </a:fld>
             <a:endParaRPr lang="en-US"/>
           </a:p>
@@ -2101,7 +2101,7 @@
           <a:p>
             <a:fld id="{5CF04FA6-8A04-5741-B772-B0883F541F5F}" type="datetimeFigureOut">
               <a:rPr lang="en-US" smtClean="0"/>
-              <a:t>5/5/24</a:t>
+              <a:t>10/24/24</a:t>
             </a:fld>
             <a:endParaRPr lang="en-US"/>
           </a:p>
@@ -2358,7 +2358,7 @@
           <a:p>
             <a:fld id="{5CF04FA6-8A04-5741-B772-B0883F541F5F}" type="datetimeFigureOut">
               <a:rPr lang="en-US" smtClean="0"/>
-              <a:t>5/5/24</a:t>
+              <a:t>10/24/24</a:t>
             </a:fld>
             <a:endParaRPr lang="en-US"/>
           </a:p>
@@ -2571,7 +2571,7 @@
           <a:p>
             <a:fld id="{5CF04FA6-8A04-5741-B772-B0883F541F5F}" type="datetimeFigureOut">
               <a:rPr lang="en-US" smtClean="0"/>
-              <a:t>5/5/24</a:t>
+              <a:t>10/24/24</a:t>
             </a:fld>
             <a:endParaRPr lang="en-US"/>
           </a:p>
@@ -3006,12 +3006,47 @@
           </a:prstGeom>
         </p:spPr>
       </p:pic>
+      <p:sp>
+        <p:nvSpPr>
+          <p:cNvPr id="12" name="TextBox 11">
+            <a:extLst>
+              <a:ext uri="{FF2B5EF4-FFF2-40B4-BE49-F238E27FC236}">
+                <a16:creationId xmlns:a16="http://schemas.microsoft.com/office/drawing/2014/main" id="{A1561828-8AD1-392B-65FE-A524AFE77CDC}"/>
+              </a:ext>
+            </a:extLst>
+          </p:cNvPr>
+          <p:cNvSpPr txBox="1"/>
+          <p:nvPr/>
+        </p:nvSpPr>
+        <p:spPr>
+          <a:xfrm>
+            <a:off x="5002636" y="9208427"/>
+            <a:ext cx="3811979" cy="369332"/>
+          </a:xfrm>
+          <a:prstGeom prst="rect">
+            <a:avLst/>
+          </a:prstGeom>
+          <a:noFill/>
+        </p:spPr>
+        <p:txBody>
+          <a:bodyPr wrap="square" rtlCol="0">
+            <a:spAutoFit/>
+          </a:bodyPr>
+          <a:lstStyle/>
+          <a:p>
+            <a:r>
+              <a:rPr lang="en-US" dirty="0"/>
+              <a:t>Both databases, in-hospital mortality</a:t>
+            </a:r>
+          </a:p>
+        </p:txBody>
+      </p:sp>
       <p:pic>
         <p:nvPicPr>
-          <p:cNvPr id="11" name="Picture 10">
+          <p:cNvPr id="3" name="Picture 2">
             <a:extLst>
               <a:ext uri="{FF2B5EF4-FFF2-40B4-BE49-F238E27FC236}">
-                <a16:creationId xmlns:a16="http://schemas.microsoft.com/office/drawing/2014/main" id="{A5975B34-D5FB-7033-67BD-39B8AA860C37}"/>
+                <a16:creationId xmlns:a16="http://schemas.microsoft.com/office/drawing/2014/main" id="{2AD66BA3-31E9-DD29-F0EC-9AC89B0EE1E8}"/>
               </a:ext>
             </a:extLst>
           </p:cNvPr>
@@ -3028,49 +3063,14 @@
         </p:blipFill>
         <p:spPr>
           <a:xfrm>
-            <a:off x="3699291" y="707892"/>
-            <a:ext cx="3419528" cy="4037612"/>
+            <a:off x="3965198" y="707891"/>
+            <a:ext cx="3420873" cy="4039200"/>
           </a:xfrm>
           <a:prstGeom prst="rect">
             <a:avLst/>
           </a:prstGeom>
         </p:spPr>
       </p:pic>
-      <p:sp>
-        <p:nvSpPr>
-          <p:cNvPr id="12" name="TextBox 11">
-            <a:extLst>
-              <a:ext uri="{FF2B5EF4-FFF2-40B4-BE49-F238E27FC236}">
-                <a16:creationId xmlns:a16="http://schemas.microsoft.com/office/drawing/2014/main" id="{A1561828-8AD1-392B-65FE-A524AFE77CDC}"/>
-              </a:ext>
-            </a:extLst>
-          </p:cNvPr>
-          <p:cNvSpPr txBox="1"/>
-          <p:nvPr/>
-        </p:nvSpPr>
-        <p:spPr>
-          <a:xfrm>
-            <a:off x="5002636" y="9208427"/>
-            <a:ext cx="3811979" cy="369332"/>
-          </a:xfrm>
-          <a:prstGeom prst="rect">
-            <a:avLst/>
-          </a:prstGeom>
-          <a:noFill/>
-        </p:spPr>
-        <p:txBody>
-          <a:bodyPr wrap="square" rtlCol="0">
-            <a:spAutoFit/>
-          </a:bodyPr>
-          <a:lstStyle/>
-          <a:p>
-            <a:r>
-              <a:rPr lang="en-US" dirty="0"/>
-              <a:t>Both databases, in-hospital mortality</a:t>
-            </a:r>
-          </a:p>
-        </p:txBody>
-      </p:sp>
     </p:spTree>
     <p:extLst>
       <p:ext uri="{BB962C8B-B14F-4D97-AF65-F5344CB8AC3E}">
@@ -3138,10 +3138,10 @@
       </p:sp>
       <p:pic>
         <p:nvPicPr>
-          <p:cNvPr id="7" name="Picture 6">
+          <p:cNvPr id="16" name="Picture 15">
             <a:extLst>
               <a:ext uri="{FF2B5EF4-FFF2-40B4-BE49-F238E27FC236}">
-                <a16:creationId xmlns:a16="http://schemas.microsoft.com/office/drawing/2014/main" id="{1E83454E-78E6-C5C6-FF05-01E024FF11F9}"/>
+                <a16:creationId xmlns:a16="http://schemas.microsoft.com/office/drawing/2014/main" id="{DBD488BC-0AA9-6276-64BB-CF30046E7F94}"/>
               </a:ext>
             </a:extLst>
           </p:cNvPr>
@@ -3158,8 +3158,8 @@
         </p:blipFill>
         <p:spPr>
           <a:xfrm>
-            <a:off x="4035552" y="544418"/>
-            <a:ext cx="3420000" cy="4038169"/>
+            <a:off x="7455552" y="532587"/>
+            <a:ext cx="5400000" cy="4050000"/>
           </a:xfrm>
           <a:prstGeom prst="rect">
             <a:avLst/>
@@ -3168,10 +3168,10 @@
       </p:pic>
       <p:pic>
         <p:nvPicPr>
-          <p:cNvPr id="16" name="Picture 15">
+          <p:cNvPr id="3" name="Picture 2">
             <a:extLst>
               <a:ext uri="{FF2B5EF4-FFF2-40B4-BE49-F238E27FC236}">
-                <a16:creationId xmlns:a16="http://schemas.microsoft.com/office/drawing/2014/main" id="{DBD488BC-0AA9-6276-64BB-CF30046E7F94}"/>
+                <a16:creationId xmlns:a16="http://schemas.microsoft.com/office/drawing/2014/main" id="{E0A49819-5E9D-67F7-6168-0F0D8215BAC8}"/>
               </a:ext>
             </a:extLst>
           </p:cNvPr>
@@ -3188,8 +3188,8 @@
         </p:blipFill>
         <p:spPr>
           <a:xfrm>
-            <a:off x="7455552" y="532587"/>
-            <a:ext cx="5400000" cy="4050000"/>
+            <a:off x="4169570" y="532587"/>
+            <a:ext cx="3420873" cy="4039200"/>
           </a:xfrm>
           <a:prstGeom prst="rect">
             <a:avLst/>

</xml_diff>